<commit_message>
working on the pdfs
</commit_message>
<xml_diff>
--- a/09_DevelopingDataProducts/lectures/rCharts.pptx
+++ b/09_DevelopingDataProducts/lectures/rCharts.pptx
@@ -22,6 +22,12 @@
     <p:sldId id="271" r:id="rId16"/>
     <p:sldId id="272" r:id="rId17"/>
     <p:sldId id="273" r:id="rId18"/>
+    <p:sldId id="274" r:id="rId19"/>
+    <p:sldId id="275" r:id="rId20"/>
+    <p:sldId id="276" r:id="rId21"/>
+    <p:sldId id="277" r:id="rId22"/>
+    <p:sldId id="278" r:id="rId23"/>
+    <p:sldId id="279" r:id="rId24"/>
   </p:sldIdLst>
   <p:sldSz cx="12192000" cy="6858000"/>
   <p:notesSz cx="6858000" cy="9144000"/>
@@ -3423,10 +3429,142 @@
           <a:chExt cx="0" cy="0"/>
         </a:xfrm>
       </p:grpSpPr>
+      <p:pic>
+        <p:nvPicPr>
+          <p:cNvPr id="2" name="Picture 1"/>
+          <p:cNvPicPr>
+            <a:picLocks noChangeAspect="1"/>
+          </p:cNvPicPr>
+          <p:nvPr/>
+        </p:nvPicPr>
+        <p:blipFill>
+          <a:blip r:embed="rId2"/>
+          <a:stretch>
+            <a:fillRect/>
+          </a:stretch>
+        </p:blipFill>
+        <p:spPr>
+          <a:xfrm>
+            <a:off x="0" y="0"/>
+            <a:ext cx="10786820" cy="6865925"/>
+          </a:xfrm>
+          <a:prstGeom prst="rect">
+            <a:avLst/>
+          </a:prstGeom>
+        </p:spPr>
+      </p:pic>
     </p:spTree>
     <p:extLst>
       <p:ext uri="{BB962C8B-B14F-4D97-AF65-F5344CB8AC3E}">
         <p14:creationId xmlns:p14="http://schemas.microsoft.com/office/powerpoint/2010/main" val="1184831169"/>
+      </p:ext>
+    </p:extLst>
+  </p:cSld>
+  <p:clrMapOvr>
+    <a:masterClrMapping/>
+  </p:clrMapOvr>
+</p:sld>
+</file>
+
+<file path=ppt/slides/slide18.xml><?xml version="1.0" encoding="utf-8"?>
+<p:sld xmlns:a="http://schemas.openxmlformats.org/drawingml/2006/main" xmlns:r="http://schemas.openxmlformats.org/officeDocument/2006/relationships" xmlns:p="http://schemas.openxmlformats.org/presentationml/2006/main">
+  <p:cSld>
+    <p:spTree>
+      <p:nvGrpSpPr>
+        <p:cNvPr id="1" name=""/>
+        <p:cNvGrpSpPr/>
+        <p:nvPr/>
+      </p:nvGrpSpPr>
+      <p:grpSpPr>
+        <a:xfrm>
+          <a:off x="0" y="0"/>
+          <a:ext cx="0" cy="0"/>
+          <a:chOff x="0" y="0"/>
+          <a:chExt cx="0" cy="0"/>
+        </a:xfrm>
+      </p:grpSpPr>
+      <p:pic>
+        <p:nvPicPr>
+          <p:cNvPr id="2" name="Picture 1"/>
+          <p:cNvPicPr>
+            <a:picLocks noChangeAspect="1"/>
+          </p:cNvPicPr>
+          <p:nvPr/>
+        </p:nvPicPr>
+        <p:blipFill>
+          <a:blip r:embed="rId2"/>
+          <a:stretch>
+            <a:fillRect/>
+          </a:stretch>
+        </p:blipFill>
+        <p:spPr>
+          <a:xfrm>
+            <a:off x="0" y="0"/>
+            <a:ext cx="10910454" cy="6858000"/>
+          </a:xfrm>
+          <a:prstGeom prst="rect">
+            <a:avLst/>
+          </a:prstGeom>
+        </p:spPr>
+      </p:pic>
+    </p:spTree>
+    <p:extLst>
+      <p:ext uri="{BB962C8B-B14F-4D97-AF65-F5344CB8AC3E}">
+        <p14:creationId xmlns:p14="http://schemas.microsoft.com/office/powerpoint/2010/main" val="3376011131"/>
+      </p:ext>
+    </p:extLst>
+  </p:cSld>
+  <p:clrMapOvr>
+    <a:masterClrMapping/>
+  </p:clrMapOvr>
+</p:sld>
+</file>
+
+<file path=ppt/slides/slide19.xml><?xml version="1.0" encoding="utf-8"?>
+<p:sld xmlns:a="http://schemas.openxmlformats.org/drawingml/2006/main" xmlns:r="http://schemas.openxmlformats.org/officeDocument/2006/relationships" xmlns:p="http://schemas.openxmlformats.org/presentationml/2006/main">
+  <p:cSld>
+    <p:spTree>
+      <p:nvGrpSpPr>
+        <p:cNvPr id="1" name=""/>
+        <p:cNvGrpSpPr/>
+        <p:nvPr/>
+      </p:nvGrpSpPr>
+      <p:grpSpPr>
+        <a:xfrm>
+          <a:off x="0" y="0"/>
+          <a:ext cx="0" cy="0"/>
+          <a:chOff x="0" y="0"/>
+          <a:chExt cx="0" cy="0"/>
+        </a:xfrm>
+      </p:grpSpPr>
+      <p:pic>
+        <p:nvPicPr>
+          <p:cNvPr id="2" name="Picture 1"/>
+          <p:cNvPicPr>
+            <a:picLocks noChangeAspect="1"/>
+          </p:cNvPicPr>
+          <p:nvPr/>
+        </p:nvPicPr>
+        <p:blipFill>
+          <a:blip r:embed="rId2"/>
+          <a:stretch>
+            <a:fillRect/>
+          </a:stretch>
+        </p:blipFill>
+        <p:spPr>
+          <a:xfrm>
+            <a:off x="-1" y="0"/>
+            <a:ext cx="10910807" cy="6849562"/>
+          </a:xfrm>
+          <a:prstGeom prst="rect">
+            <a:avLst/>
+          </a:prstGeom>
+        </p:spPr>
+      </p:pic>
+    </p:spTree>
+    <p:extLst>
+      <p:ext uri="{BB962C8B-B14F-4D97-AF65-F5344CB8AC3E}">
+        <p14:creationId xmlns:p14="http://schemas.microsoft.com/office/powerpoint/2010/main" val="1894495238"/>
       </p:ext>
     </p:extLst>
   </p:cSld>
@@ -3481,6 +3619,222 @@
     <p:extLst>
       <p:ext uri="{BB962C8B-B14F-4D97-AF65-F5344CB8AC3E}">
         <p14:creationId xmlns:p14="http://schemas.microsoft.com/office/powerpoint/2010/main" val="1191873542"/>
+      </p:ext>
+    </p:extLst>
+  </p:cSld>
+  <p:clrMapOvr>
+    <a:masterClrMapping/>
+  </p:clrMapOvr>
+</p:sld>
+</file>
+
+<file path=ppt/slides/slide20.xml><?xml version="1.0" encoding="utf-8"?>
+<p:sld xmlns:a="http://schemas.openxmlformats.org/drawingml/2006/main" xmlns:r="http://schemas.openxmlformats.org/officeDocument/2006/relationships" xmlns:p="http://schemas.openxmlformats.org/presentationml/2006/main">
+  <p:cSld>
+    <p:spTree>
+      <p:nvGrpSpPr>
+        <p:cNvPr id="1" name=""/>
+        <p:cNvGrpSpPr/>
+        <p:nvPr/>
+      </p:nvGrpSpPr>
+      <p:grpSpPr>
+        <a:xfrm>
+          <a:off x="0" y="0"/>
+          <a:ext cx="0" cy="0"/>
+          <a:chOff x="0" y="0"/>
+          <a:chExt cx="0" cy="0"/>
+        </a:xfrm>
+      </p:grpSpPr>
+      <p:pic>
+        <p:nvPicPr>
+          <p:cNvPr id="2" name="Picture 1"/>
+          <p:cNvPicPr>
+            <a:picLocks noChangeAspect="1"/>
+          </p:cNvPicPr>
+          <p:nvPr/>
+        </p:nvPicPr>
+        <p:blipFill>
+          <a:blip r:embed="rId2"/>
+          <a:stretch>
+            <a:fillRect/>
+          </a:stretch>
+        </p:blipFill>
+        <p:spPr>
+          <a:xfrm>
+            <a:off x="0" y="0"/>
+            <a:ext cx="10771322" cy="6887144"/>
+          </a:xfrm>
+          <a:prstGeom prst="rect">
+            <a:avLst/>
+          </a:prstGeom>
+        </p:spPr>
+      </p:pic>
+    </p:spTree>
+    <p:extLst>
+      <p:ext uri="{BB962C8B-B14F-4D97-AF65-F5344CB8AC3E}">
+        <p14:creationId xmlns:p14="http://schemas.microsoft.com/office/powerpoint/2010/main" val="826724867"/>
+      </p:ext>
+    </p:extLst>
+  </p:cSld>
+  <p:clrMapOvr>
+    <a:masterClrMapping/>
+  </p:clrMapOvr>
+</p:sld>
+</file>
+
+<file path=ppt/slides/slide21.xml><?xml version="1.0" encoding="utf-8"?>
+<p:sld xmlns:a="http://schemas.openxmlformats.org/drawingml/2006/main" xmlns:r="http://schemas.openxmlformats.org/officeDocument/2006/relationships" xmlns:p="http://schemas.openxmlformats.org/presentationml/2006/main">
+  <p:cSld>
+    <p:spTree>
+      <p:nvGrpSpPr>
+        <p:cNvPr id="1" name=""/>
+        <p:cNvGrpSpPr/>
+        <p:nvPr/>
+      </p:nvGrpSpPr>
+      <p:grpSpPr>
+        <a:xfrm>
+          <a:off x="0" y="0"/>
+          <a:ext cx="0" cy="0"/>
+          <a:chOff x="0" y="0"/>
+          <a:chExt cx="0" cy="0"/>
+        </a:xfrm>
+      </p:grpSpPr>
+      <p:pic>
+        <p:nvPicPr>
+          <p:cNvPr id="2" name="Picture 1"/>
+          <p:cNvPicPr>
+            <a:picLocks noChangeAspect="1"/>
+          </p:cNvPicPr>
+          <p:nvPr/>
+        </p:nvPicPr>
+        <p:blipFill>
+          <a:blip r:embed="rId2"/>
+          <a:stretch>
+            <a:fillRect/>
+          </a:stretch>
+        </p:blipFill>
+        <p:spPr>
+          <a:xfrm>
+            <a:off x="0" y="0"/>
+            <a:ext cx="10786820" cy="6873702"/>
+          </a:xfrm>
+          <a:prstGeom prst="rect">
+            <a:avLst/>
+          </a:prstGeom>
+        </p:spPr>
+      </p:pic>
+    </p:spTree>
+    <p:extLst>
+      <p:ext uri="{BB962C8B-B14F-4D97-AF65-F5344CB8AC3E}">
+        <p14:creationId xmlns:p14="http://schemas.microsoft.com/office/powerpoint/2010/main" val="224627820"/>
+      </p:ext>
+    </p:extLst>
+  </p:cSld>
+  <p:clrMapOvr>
+    <a:masterClrMapping/>
+  </p:clrMapOvr>
+</p:sld>
+</file>
+
+<file path=ppt/slides/slide22.xml><?xml version="1.0" encoding="utf-8"?>
+<p:sld xmlns:a="http://schemas.openxmlformats.org/drawingml/2006/main" xmlns:r="http://schemas.openxmlformats.org/officeDocument/2006/relationships" xmlns:p="http://schemas.openxmlformats.org/presentationml/2006/main">
+  <p:cSld>
+    <p:spTree>
+      <p:nvGrpSpPr>
+        <p:cNvPr id="1" name=""/>
+        <p:cNvGrpSpPr/>
+        <p:nvPr/>
+      </p:nvGrpSpPr>
+      <p:grpSpPr>
+        <a:xfrm>
+          <a:off x="0" y="0"/>
+          <a:ext cx="0" cy="0"/>
+          <a:chOff x="0" y="0"/>
+          <a:chExt cx="0" cy="0"/>
+        </a:xfrm>
+      </p:grpSpPr>
+      <p:pic>
+        <p:nvPicPr>
+          <p:cNvPr id="2" name="Picture 1"/>
+          <p:cNvPicPr>
+            <a:picLocks noChangeAspect="1"/>
+          </p:cNvPicPr>
+          <p:nvPr/>
+        </p:nvPicPr>
+        <p:blipFill>
+          <a:blip r:embed="rId2"/>
+          <a:stretch>
+            <a:fillRect/>
+          </a:stretch>
+        </p:blipFill>
+        <p:spPr>
+          <a:xfrm>
+            <a:off x="0" y="0"/>
+            <a:ext cx="10635857" cy="6858000"/>
+          </a:xfrm>
+          <a:prstGeom prst="rect">
+            <a:avLst/>
+          </a:prstGeom>
+        </p:spPr>
+      </p:pic>
+    </p:spTree>
+    <p:extLst>
+      <p:ext uri="{BB962C8B-B14F-4D97-AF65-F5344CB8AC3E}">
+        <p14:creationId xmlns:p14="http://schemas.microsoft.com/office/powerpoint/2010/main" val="1320352381"/>
+      </p:ext>
+    </p:extLst>
+  </p:cSld>
+  <p:clrMapOvr>
+    <a:masterClrMapping/>
+  </p:clrMapOvr>
+</p:sld>
+</file>
+
+<file path=ppt/slides/slide23.xml><?xml version="1.0" encoding="utf-8"?>
+<p:sld xmlns:a="http://schemas.openxmlformats.org/drawingml/2006/main" xmlns:r="http://schemas.openxmlformats.org/officeDocument/2006/relationships" xmlns:p="http://schemas.openxmlformats.org/presentationml/2006/main">
+  <p:cSld>
+    <p:spTree>
+      <p:nvGrpSpPr>
+        <p:cNvPr id="1" name=""/>
+        <p:cNvGrpSpPr/>
+        <p:nvPr/>
+      </p:nvGrpSpPr>
+      <p:grpSpPr>
+        <a:xfrm>
+          <a:off x="0" y="0"/>
+          <a:ext cx="0" cy="0"/>
+          <a:chOff x="0" y="0"/>
+          <a:chExt cx="0" cy="0"/>
+        </a:xfrm>
+      </p:grpSpPr>
+      <p:pic>
+        <p:nvPicPr>
+          <p:cNvPr id="2" name="Picture 1"/>
+          <p:cNvPicPr>
+            <a:picLocks noChangeAspect="1"/>
+          </p:cNvPicPr>
+          <p:nvPr/>
+        </p:nvPicPr>
+        <p:blipFill>
+          <a:blip r:embed="rId2"/>
+          <a:stretch>
+            <a:fillRect/>
+          </a:stretch>
+        </p:blipFill>
+        <p:spPr>
+          <a:xfrm>
+            <a:off x="0" y="-1"/>
+            <a:ext cx="10631837" cy="6873449"/>
+          </a:xfrm>
+          <a:prstGeom prst="rect">
+            <a:avLst/>
+          </a:prstGeom>
+        </p:spPr>
+      </p:pic>
+    </p:spTree>
+    <p:extLst>
+      <p:ext uri="{BB962C8B-B14F-4D97-AF65-F5344CB8AC3E}">
+        <p14:creationId xmlns:p14="http://schemas.microsoft.com/office/powerpoint/2010/main" val="3643356728"/>
       </p:ext>
     </p:extLst>
   </p:cSld>

</xml_diff>